<commit_message>
Slightly simplified code Updated presentation
</commit_message>
<xml_diff>
--- a/Inversion of Control.pptx
+++ b/Inversion of Control.pptx
@@ -7,12 +7,14 @@
   <p:sldIdLst>
     <p:sldId id="256" r:id="rId2"/>
     <p:sldId id="258" r:id="rId3"/>
-    <p:sldId id="259" r:id="rId4"/>
-    <p:sldId id="262" r:id="rId5"/>
-    <p:sldId id="264" r:id="rId6"/>
-    <p:sldId id="263" r:id="rId7"/>
-    <p:sldId id="257" r:id="rId8"/>
-    <p:sldId id="261" r:id="rId9"/>
+    <p:sldId id="265" r:id="rId4"/>
+    <p:sldId id="259" r:id="rId5"/>
+    <p:sldId id="262" r:id="rId6"/>
+    <p:sldId id="264" r:id="rId7"/>
+    <p:sldId id="263" r:id="rId8"/>
+    <p:sldId id="266" r:id="rId9"/>
+    <p:sldId id="257" r:id="rId10"/>
+    <p:sldId id="261" r:id="rId11"/>
   </p:sldIdLst>
   <p:sldSz cx="9144000" cy="6858000" type="screen4x3"/>
   <p:notesSz cx="6858000" cy="9144000"/>
@@ -499,7 +501,7 @@
             <a:fld id="{98B39A80-CAE3-4B73-8301-E5A687E05A5D}" type="datetimeFigureOut">
               <a:rPr lang="ru-RU" smtClean="0"/>
               <a:pPr/>
-              <a:t>24.10.2010</a:t>
+              <a:t>29.10.2010</a:t>
             </a:fld>
             <a:endParaRPr lang="ru-RU"/>
           </a:p>
@@ -553,6 +555,9 @@
   <p:clrMapOvr>
     <a:overrideClrMapping bg1="dk1" tx1="lt1" bg2="dk2" tx2="lt2" accent1="accent1" accent2="accent2" accent3="accent3" accent4="accent4" accent5="accent5" accent6="accent6" hlink="hlink" folHlink="folHlink"/>
   </p:clrMapOvr>
+  <p:transition>
+    <p:fade/>
+  </p:transition>
 </p:sldLayout>
 </file>
 
@@ -666,7 +671,7 @@
             <a:fld id="{98B39A80-CAE3-4B73-8301-E5A687E05A5D}" type="datetimeFigureOut">
               <a:rPr lang="ru-RU" smtClean="0"/>
               <a:pPr/>
-              <a:t>24.10.2010</a:t>
+              <a:t>29.10.2010</a:t>
             </a:fld>
             <a:endParaRPr lang="ru-RU"/>
           </a:p>
@@ -720,6 +725,9 @@
   <p:clrMapOvr>
     <a:masterClrMapping/>
   </p:clrMapOvr>
+  <p:transition>
+    <p:fade/>
+  </p:transition>
 </p:sldLayout>
 </file>
 
@@ -843,7 +851,7 @@
             <a:fld id="{98B39A80-CAE3-4B73-8301-E5A687E05A5D}" type="datetimeFigureOut">
               <a:rPr lang="ru-RU" smtClean="0"/>
               <a:pPr/>
-              <a:t>24.10.2010</a:t>
+              <a:t>29.10.2010</a:t>
             </a:fld>
             <a:endParaRPr lang="ru-RU"/>
           </a:p>
@@ -897,6 +905,9 @@
   <p:clrMapOvr>
     <a:masterClrMapping/>
   </p:clrMapOvr>
+  <p:transition>
+    <p:fade/>
+  </p:transition>
 </p:sldLayout>
 </file>
 
@@ -1014,7 +1025,7 @@
             <a:fld id="{98B39A80-CAE3-4B73-8301-E5A687E05A5D}" type="datetimeFigureOut">
               <a:rPr lang="ru-RU" smtClean="0"/>
               <a:pPr/>
-              <a:t>24.10.2010</a:t>
+              <a:t>29.10.2010</a:t>
             </a:fld>
             <a:endParaRPr lang="ru-RU"/>
           </a:p>
@@ -1068,6 +1079,9 @@
   <p:clrMapOvr>
     <a:masterClrMapping/>
   </p:clrMapOvr>
+  <p:transition>
+    <p:fade/>
+  </p:transition>
 </p:sldLayout>
 </file>
 
@@ -1471,7 +1485,7 @@
             <a:fld id="{98B39A80-CAE3-4B73-8301-E5A687E05A5D}" type="datetimeFigureOut">
               <a:rPr lang="ru-RU" smtClean="0"/>
               <a:pPr/>
-              <a:t>24.10.2010</a:t>
+              <a:t>29.10.2010</a:t>
             </a:fld>
             <a:endParaRPr lang="ru-RU"/>
           </a:p>
@@ -1525,6 +1539,9 @@
   <p:clrMapOvr>
     <a:overrideClrMapping bg1="dk1" tx1="lt1" bg2="dk2" tx2="lt2" accent1="accent1" accent2="accent2" accent3="accent3" accent4="accent4" accent5="accent5" accent6="accent6" hlink="hlink" folHlink="folHlink"/>
   </p:clrMapOvr>
+  <p:transition>
+    <p:fade/>
+  </p:transition>
 </p:sldLayout>
 </file>
 
@@ -1737,7 +1754,7 @@
             <a:fld id="{98B39A80-CAE3-4B73-8301-E5A687E05A5D}" type="datetimeFigureOut">
               <a:rPr lang="ru-RU" smtClean="0"/>
               <a:pPr/>
-              <a:t>24.10.2010</a:t>
+              <a:t>29.10.2010</a:t>
             </a:fld>
             <a:endParaRPr lang="ru-RU"/>
           </a:p>
@@ -1791,6 +1808,9 @@
   <p:clrMapOvr>
     <a:masterClrMapping/>
   </p:clrMapOvr>
+  <p:transition>
+    <p:fade/>
+  </p:transition>
 </p:sldLayout>
 </file>
 
@@ -2113,7 +2133,7 @@
             <a:fld id="{98B39A80-CAE3-4B73-8301-E5A687E05A5D}" type="datetimeFigureOut">
               <a:rPr lang="ru-RU" smtClean="0"/>
               <a:pPr/>
-              <a:t>24.10.2010</a:t>
+              <a:t>29.10.2010</a:t>
             </a:fld>
             <a:endParaRPr lang="ru-RU"/>
           </a:p>
@@ -2167,6 +2187,9 @@
   <p:clrMapOvr>
     <a:masterClrMapping/>
   </p:clrMapOvr>
+  <p:transition>
+    <p:fade/>
+  </p:transition>
 </p:sldLayout>
 </file>
 
@@ -2237,7 +2260,7 @@
             <a:fld id="{98B39A80-CAE3-4B73-8301-E5A687E05A5D}" type="datetimeFigureOut">
               <a:rPr lang="ru-RU" smtClean="0"/>
               <a:pPr/>
-              <a:t>24.10.2010</a:t>
+              <a:t>29.10.2010</a:t>
             </a:fld>
             <a:endParaRPr lang="ru-RU"/>
           </a:p>
@@ -2291,6 +2314,9 @@
   <p:clrMapOvr>
     <a:masterClrMapping/>
   </p:clrMapOvr>
+  <p:transition>
+    <p:fade/>
+  </p:transition>
 </p:sldLayout>
 </file>
 
@@ -2329,7 +2355,7 @@
             <a:fld id="{98B39A80-CAE3-4B73-8301-E5A687E05A5D}" type="datetimeFigureOut">
               <a:rPr lang="ru-RU" smtClean="0"/>
               <a:pPr/>
-              <a:t>24.10.2010</a:t>
+              <a:t>29.10.2010</a:t>
             </a:fld>
             <a:endParaRPr lang="ru-RU"/>
           </a:p>
@@ -2383,6 +2409,9 @@
   <p:clrMapOvr>
     <a:masterClrMapping/>
   </p:clrMapOvr>
+  <p:transition>
+    <p:fade/>
+  </p:transition>
 </p:sldLayout>
 </file>
 
@@ -2580,7 +2609,7 @@
             <a:fld id="{98B39A80-CAE3-4B73-8301-E5A687E05A5D}" type="datetimeFigureOut">
               <a:rPr lang="ru-RU" smtClean="0"/>
               <a:pPr/>
-              <a:t>24.10.2010</a:t>
+              <a:t>29.10.2010</a:t>
             </a:fld>
             <a:endParaRPr lang="ru-RU"/>
           </a:p>
@@ -2639,6 +2668,9 @@
   <p:clrMapOvr>
     <a:masterClrMapping/>
   </p:clrMapOvr>
+  <p:transition>
+    <p:fade/>
+  </p:transition>
 </p:sldLayout>
 </file>
 
@@ -2841,7 +2873,7 @@
             <a:fld id="{98B39A80-CAE3-4B73-8301-E5A687E05A5D}" type="datetimeFigureOut">
               <a:rPr lang="ru-RU" smtClean="0"/>
               <a:pPr/>
-              <a:t>24.10.2010</a:t>
+              <a:t>29.10.2010</a:t>
             </a:fld>
             <a:endParaRPr lang="ru-RU"/>
           </a:p>
@@ -2895,6 +2927,9 @@
   <p:clrMapOvr>
     <a:masterClrMapping/>
   </p:clrMapOvr>
+  <p:transition>
+    <p:fade/>
+  </p:transition>
 </p:sldLayout>
 </file>
 
@@ -3247,7 +3282,7 @@
             <a:fld id="{98B39A80-CAE3-4B73-8301-E5A687E05A5D}" type="datetimeFigureOut">
               <a:rPr lang="ru-RU" smtClean="0"/>
               <a:pPr/>
-              <a:t>24.10.2010</a:t>
+              <a:t>29.10.2010</a:t>
             </a:fld>
             <a:endParaRPr lang="ru-RU"/>
           </a:p>
@@ -3348,6 +3383,9 @@
     <p:sldLayoutId id="2147483790" r:id="rId10"/>
     <p:sldLayoutId id="2147483791" r:id="rId11"/>
   </p:sldLayoutIdLst>
+  <p:transition>
+    <p:fade/>
+  </p:transition>
   <p:txStyles>
     <p:titleStyle>
       <a:lvl1pPr algn="l" rtl="0" eaLnBrk="1" latinLnBrk="0" hangingPunct="1">
@@ -3669,8 +3707,20 @@
           <a:lstStyle/>
           <a:p>
             <a:r>
+              <a:rPr lang="en-US" dirty="0" smtClean="0">
+                <a:effectLst>
+                  <a:outerShdw blurRad="38100" dist="38100" dir="2700000" algn="tl">
+                    <a:srgbClr val="000000">
+                      <a:alpha val="43137"/>
+                    </a:srgbClr>
+                  </a:outerShdw>
+                </a:effectLst>
+              </a:rPr>
+              <a:t>Inversion</a:t>
+            </a:r>
+            <a:r>
               <a:rPr lang="en-US" dirty="0" smtClean="0"/>
-              <a:t>Inversion of Control</a:t>
+              <a:t> of Control</a:t>
             </a:r>
             <a:endParaRPr lang="ru-RU" dirty="0"/>
           </a:p>
@@ -3681,6 +3731,213 @@
   <p:clrMapOvr>
     <a:masterClrMapping/>
   </p:clrMapOvr>
+  <p:transition>
+    <p:fade/>
+  </p:transition>
+  <p:timing>
+    <p:tnLst>
+      <p:par>
+        <p:cTn id="1" dur="indefinite" restart="never" nodeType="tmRoot"/>
+      </p:par>
+    </p:tnLst>
+  </p:timing>
+</p:sld>
+</file>
+
+<file path=ppt/slides/slide10.xml><?xml version="1.0" encoding="utf-8"?>
+<p:sld xmlns:a="http://schemas.openxmlformats.org/drawingml/2006/main" xmlns:r="http://schemas.openxmlformats.org/officeDocument/2006/relationships" xmlns:p="http://schemas.openxmlformats.org/presentationml/2006/main">
+  <p:cSld>
+    <p:spTree>
+      <p:nvGrpSpPr>
+        <p:cNvPr id="1" name=""/>
+        <p:cNvGrpSpPr/>
+        <p:nvPr/>
+      </p:nvGrpSpPr>
+      <p:grpSpPr>
+        <a:xfrm>
+          <a:off x="0" y="0"/>
+          <a:ext cx="0" cy="0"/>
+          <a:chOff x="0" y="0"/>
+          <a:chExt cx="0" cy="0"/>
+        </a:xfrm>
+      </p:grpSpPr>
+      <p:sp>
+        <p:nvSpPr>
+          <p:cNvPr id="2" name="Title 1"/>
+          <p:cNvSpPr>
+            <a:spLocks noGrp="1"/>
+          </p:cNvSpPr>
+          <p:nvPr>
+            <p:ph type="title"/>
+          </p:nvPr>
+        </p:nvSpPr>
+        <p:spPr/>
+        <p:txBody>
+          <a:bodyPr>
+            <a:normAutofit/>
+          </a:bodyPr>
+          <a:lstStyle/>
+          <a:p>
+            <a:pPr algn="ctr"/>
+            <a:r>
+              <a:rPr lang="en-US" sz="4000" dirty="0" smtClean="0">
+                <a:solidFill>
+                  <a:schemeClr val="accent1"/>
+                </a:solidFill>
+                <a:effectLst>
+                  <a:outerShdw blurRad="38100" dist="38100" dir="2700000" algn="tl">
+                    <a:srgbClr val="000000">
+                      <a:alpha val="43137"/>
+                    </a:srgbClr>
+                  </a:outerShdw>
+                </a:effectLst>
+                <a:latin typeface="Calibri" pitchFamily="34" charset="0"/>
+                <a:cs typeface="Calibri" pitchFamily="34" charset="0"/>
+              </a:rPr>
+              <a:t>Modern </a:t>
+            </a:r>
+            <a:r>
+              <a:rPr lang="en-US" sz="4000" dirty="0" err="1" smtClean="0">
+                <a:solidFill>
+                  <a:schemeClr val="accent1"/>
+                </a:solidFill>
+                <a:effectLst>
+                  <a:outerShdw blurRad="38100" dist="38100" dir="2700000" algn="tl">
+                    <a:srgbClr val="000000">
+                      <a:alpha val="43137"/>
+                    </a:srgbClr>
+                  </a:outerShdw>
+                </a:effectLst>
+                <a:latin typeface="Calibri" pitchFamily="34" charset="0"/>
+                <a:cs typeface="Calibri" pitchFamily="34" charset="0"/>
+              </a:rPr>
+              <a:t>.Net</a:t>
+            </a:r>
+            <a:r>
+              <a:rPr lang="en-US" sz="4000" dirty="0" smtClean="0">
+                <a:solidFill>
+                  <a:schemeClr val="accent1"/>
+                </a:solidFill>
+                <a:effectLst>
+                  <a:outerShdw blurRad="38100" dist="38100" dir="2700000" algn="tl">
+                    <a:srgbClr val="000000">
+                      <a:alpha val="43137"/>
+                    </a:srgbClr>
+                  </a:outerShdw>
+                </a:effectLst>
+                <a:latin typeface="Calibri" pitchFamily="34" charset="0"/>
+                <a:cs typeface="Calibri" pitchFamily="34" charset="0"/>
+              </a:rPr>
+              <a:t> containers’ features</a:t>
+            </a:r>
+            <a:endParaRPr lang="ru-RU" sz="4000" dirty="0">
+              <a:solidFill>
+                <a:schemeClr val="accent1"/>
+              </a:solidFill>
+              <a:effectLst>
+                <a:outerShdw blurRad="38100" dist="38100" dir="2700000" algn="tl">
+                  <a:srgbClr val="000000">
+                    <a:alpha val="43137"/>
+                  </a:srgbClr>
+                </a:outerShdw>
+              </a:effectLst>
+              <a:latin typeface="Calibri" pitchFamily="34" charset="0"/>
+              <a:cs typeface="Calibri" pitchFamily="34" charset="0"/>
+            </a:endParaRPr>
+          </a:p>
+        </p:txBody>
+      </p:sp>
+      <p:sp>
+        <p:nvSpPr>
+          <p:cNvPr id="3" name="Content Placeholder 2"/>
+          <p:cNvSpPr>
+            <a:spLocks noGrp="1"/>
+          </p:cNvSpPr>
+          <p:nvPr>
+            <p:ph idx="1"/>
+          </p:nvPr>
+        </p:nvSpPr>
+        <p:spPr/>
+        <p:txBody>
+          <a:bodyPr/>
+          <a:lstStyle/>
+          <a:p>
+            <a:pPr>
+              <a:lnSpc>
+                <a:spcPct val="150000"/>
+              </a:lnSpc>
+            </a:pPr>
+            <a:r>
+              <a:rPr lang="en-US" dirty="0" smtClean="0">
+                <a:latin typeface="Times New Roman" pitchFamily="18" charset="0"/>
+                <a:cs typeface="Times New Roman" pitchFamily="18" charset="0"/>
+              </a:rPr>
+              <a:t>Instance lifecycle management</a:t>
+            </a:r>
+          </a:p>
+          <a:p>
+            <a:pPr>
+              <a:lnSpc>
+                <a:spcPct val="150000"/>
+              </a:lnSpc>
+            </a:pPr>
+            <a:r>
+              <a:rPr lang="en-US" dirty="0" smtClean="0">
+                <a:latin typeface="Times New Roman" pitchFamily="18" charset="0"/>
+                <a:cs typeface="Times New Roman" pitchFamily="18" charset="0"/>
+              </a:rPr>
+              <a:t>Configuration through code using DSL</a:t>
+            </a:r>
+          </a:p>
+          <a:p>
+            <a:pPr>
+              <a:lnSpc>
+                <a:spcPct val="150000"/>
+              </a:lnSpc>
+            </a:pPr>
+            <a:r>
+              <a:rPr lang="en-US" dirty="0" smtClean="0">
+                <a:latin typeface="Times New Roman" pitchFamily="18" charset="0"/>
+                <a:cs typeface="Times New Roman" pitchFamily="18" charset="0"/>
+              </a:rPr>
+              <a:t>Auto configuration using conventions</a:t>
+            </a:r>
+          </a:p>
+          <a:p>
+            <a:pPr>
+              <a:lnSpc>
+                <a:spcPct val="150000"/>
+              </a:lnSpc>
+            </a:pPr>
+            <a:r>
+              <a:rPr lang="en-US" dirty="0" err="1" smtClean="0">
+                <a:latin typeface="Times New Roman" pitchFamily="18" charset="0"/>
+                <a:cs typeface="Times New Roman" pitchFamily="18" charset="0"/>
+              </a:rPr>
+              <a:t>Automocking</a:t>
+            </a:r>
+            <a:endParaRPr lang="ru-RU" dirty="0">
+              <a:latin typeface="Times New Roman" pitchFamily="18" charset="0"/>
+              <a:cs typeface="Times New Roman" pitchFamily="18" charset="0"/>
+            </a:endParaRPr>
+          </a:p>
+        </p:txBody>
+      </p:sp>
+    </p:spTree>
+  </p:cSld>
+  <p:clrMapOvr>
+    <a:masterClrMapping/>
+  </p:clrMapOvr>
+  <p:transition>
+    <p:fade/>
+  </p:transition>
+  <p:timing>
+    <p:tnLst>
+      <p:par>
+        <p:cTn id="1" dur="indefinite" restart="never" nodeType="tmRoot"/>
+      </p:par>
+    </p:tnLst>
+  </p:timing>
 </p:sld>
 </file>
 
@@ -3725,10 +3982,32 @@
           <a:p>
             <a:pPr algn="ctr"/>
             <a:r>
-              <a:rPr lang="en-US" sz="3700" dirty="0" smtClean="0"/>
+              <a:rPr lang="en-US" sz="3700" dirty="0" smtClean="0">
+                <a:solidFill>
+                  <a:schemeClr val="accent1"/>
+                </a:solidFill>
+                <a:effectLst>
+                  <a:outerShdw blurRad="38100" dist="38100" dir="2700000" algn="tl">
+                    <a:srgbClr val="000000">
+                      <a:alpha val="43137"/>
+                    </a:srgbClr>
+                  </a:outerShdw>
+                </a:effectLst>
+              </a:rPr>
               <a:t>The Dependency Inversion Principle</a:t>
             </a:r>
-            <a:endParaRPr lang="ru-RU" sz="3700" dirty="0"/>
+            <a:endParaRPr lang="ru-RU" sz="3700" dirty="0">
+              <a:solidFill>
+                <a:schemeClr val="accent1"/>
+              </a:solidFill>
+              <a:effectLst>
+                <a:outerShdw blurRad="38100" dist="38100" dir="2700000" algn="tl">
+                  <a:srgbClr val="000000">
+                    <a:alpha val="43137"/>
+                  </a:srgbClr>
+                </a:outerShdw>
+              </a:effectLst>
+            </a:endParaRPr>
           </a:p>
         </p:txBody>
       </p:sp>
@@ -3749,22 +4028,33 @@
           <a:p>
             <a:pPr algn="just"/>
             <a:r>
-              <a:rPr lang="en-US" dirty="0" smtClean="0"/>
+              <a:rPr lang="en-US" dirty="0" smtClean="0">
+                <a:latin typeface="Times New Roman" pitchFamily="18" charset="0"/>
+                <a:cs typeface="Times New Roman" pitchFamily="18" charset="0"/>
+              </a:rPr>
               <a:t>High level modules should not depend upon low level modules.  Both should depend upon abstractions. </a:t>
             </a:r>
-            <a:endParaRPr lang="en-US" dirty="0" smtClean="0"/>
           </a:p>
           <a:p>
             <a:pPr algn="just"/>
-            <a:endParaRPr lang="en-US" dirty="0" smtClean="0"/>
+            <a:endParaRPr lang="en-US" dirty="0" smtClean="0">
+              <a:latin typeface="Times New Roman" pitchFamily="18" charset="0"/>
+              <a:cs typeface="Times New Roman" pitchFamily="18" charset="0"/>
+            </a:endParaRPr>
           </a:p>
           <a:p>
             <a:pPr algn="just"/>
             <a:r>
-              <a:rPr lang="en-US" dirty="0" smtClean="0"/>
+              <a:rPr lang="en-US" dirty="0" smtClean="0">
+                <a:latin typeface="Times New Roman" pitchFamily="18" charset="0"/>
+                <a:cs typeface="Times New Roman" pitchFamily="18" charset="0"/>
+              </a:rPr>
               <a:t>Abstractions should not depend upon details.  Details should depend upon abstractions.</a:t>
             </a:r>
-            <a:endParaRPr lang="ru-RU" dirty="0"/>
+            <a:endParaRPr lang="ru-RU" dirty="0">
+              <a:latin typeface="Times New Roman" pitchFamily="18" charset="0"/>
+              <a:cs typeface="Times New Roman" pitchFamily="18" charset="0"/>
+            </a:endParaRPr>
           </a:p>
         </p:txBody>
       </p:sp>
@@ -3773,6 +4063,16 @@
   <p:clrMapOvr>
     <a:masterClrMapping/>
   </p:clrMapOvr>
+  <p:transition spd="slow">
+    <p:fade/>
+  </p:transition>
+  <p:timing>
+    <p:tnLst>
+      <p:par>
+        <p:cTn id="1" dur="indefinite" restart="never" nodeType="tmRoot"/>
+      </p:par>
+    </p:tnLst>
+  </p:timing>
 </p:sld>
 </file>
 
@@ -3803,6 +4103,341 @@
             <p:ph type="title"/>
           </p:nvPr>
         </p:nvSpPr>
+        <p:spPr/>
+        <p:txBody>
+          <a:bodyPr>
+            <a:normAutofit/>
+          </a:bodyPr>
+          <a:lstStyle/>
+          <a:p>
+            <a:pPr algn="ctr"/>
+            <a:r>
+              <a:rPr lang="en-US" sz="4000" dirty="0" smtClean="0">
+                <a:solidFill>
+                  <a:schemeClr val="accent1"/>
+                </a:solidFill>
+                <a:effectLst>
+                  <a:outerShdw blurRad="38100" dist="38100" dir="2700000" algn="tl">
+                    <a:srgbClr val="000000">
+                      <a:alpha val="43137"/>
+                    </a:srgbClr>
+                  </a:outerShdw>
+                </a:effectLst>
+                <a:latin typeface="Calibri" pitchFamily="34" charset="0"/>
+                <a:cs typeface="Calibri" pitchFamily="34" charset="0"/>
+              </a:rPr>
+              <a:t>Dependency Inversion example</a:t>
+            </a:r>
+            <a:endParaRPr lang="ru-RU" sz="4000" dirty="0">
+              <a:solidFill>
+                <a:schemeClr val="accent1"/>
+              </a:solidFill>
+              <a:effectLst>
+                <a:outerShdw blurRad="38100" dist="38100" dir="2700000" algn="tl">
+                  <a:srgbClr val="000000">
+                    <a:alpha val="43137"/>
+                  </a:srgbClr>
+                </a:outerShdw>
+              </a:effectLst>
+              <a:latin typeface="Calibri" pitchFamily="34" charset="0"/>
+              <a:cs typeface="Calibri" pitchFamily="34" charset="0"/>
+            </a:endParaRPr>
+          </a:p>
+        </p:txBody>
+      </p:sp>
+      <p:pic>
+        <p:nvPicPr>
+          <p:cNvPr id="1026" name="Picture 2"/>
+          <p:cNvPicPr>
+            <a:picLocks noChangeAspect="1" noChangeArrowheads="1"/>
+          </p:cNvPicPr>
+          <p:nvPr/>
+        </p:nvPicPr>
+        <p:blipFill>
+          <a:blip r:embed="rId2" cstate="print"/>
+          <a:srcRect/>
+          <a:stretch>
+            <a:fillRect/>
+          </a:stretch>
+        </p:blipFill>
+        <p:spPr bwMode="auto">
+          <a:xfrm>
+            <a:off x="1015380" y="1412776"/>
+            <a:ext cx="2457450" cy="1171575"/>
+          </a:xfrm>
+          <a:prstGeom prst="rect">
+            <a:avLst/>
+          </a:prstGeom>
+          <a:noFill/>
+          <a:ln w="9525">
+            <a:noFill/>
+            <a:miter lim="800000"/>
+            <a:headEnd/>
+            <a:tailEnd/>
+          </a:ln>
+        </p:spPr>
+      </p:pic>
+      <p:sp>
+        <p:nvSpPr>
+          <p:cNvPr id="7" name="Down Arrow 6"/>
+          <p:cNvSpPr/>
+          <p:nvPr/>
+        </p:nvSpPr>
+        <p:spPr>
+          <a:xfrm>
+            <a:off x="1951484" y="2924944"/>
+            <a:ext cx="504056" cy="1224136"/>
+          </a:xfrm>
+          <a:prstGeom prst="downArrow">
+            <a:avLst/>
+          </a:prstGeom>
+        </p:spPr>
+        <p:style>
+          <a:lnRef idx="2">
+            <a:schemeClr val="accent1">
+              <a:shade val="50000"/>
+            </a:schemeClr>
+          </a:lnRef>
+          <a:fillRef idx="1">
+            <a:schemeClr val="accent1"/>
+          </a:fillRef>
+          <a:effectRef idx="0">
+            <a:schemeClr val="accent1"/>
+          </a:effectRef>
+          <a:fontRef idx="minor">
+            <a:schemeClr val="lt1"/>
+          </a:fontRef>
+        </p:style>
+        <p:txBody>
+          <a:bodyPr rtlCol="0" anchor="ctr"/>
+          <a:lstStyle/>
+          <a:p>
+            <a:pPr algn="ctr"/>
+            <a:endParaRPr lang="ru-RU"/>
+          </a:p>
+        </p:txBody>
+      </p:sp>
+      <p:pic>
+        <p:nvPicPr>
+          <p:cNvPr id="1028" name="Picture 4"/>
+          <p:cNvPicPr>
+            <a:picLocks noChangeAspect="1" noChangeArrowheads="1"/>
+          </p:cNvPicPr>
+          <p:nvPr/>
+        </p:nvPicPr>
+        <p:blipFill>
+          <a:blip r:embed="rId3" cstate="print"/>
+          <a:srcRect/>
+          <a:stretch>
+            <a:fillRect/>
+          </a:stretch>
+        </p:blipFill>
+        <p:spPr bwMode="auto">
+          <a:xfrm>
+            <a:off x="1015380" y="4426793"/>
+            <a:ext cx="2476500" cy="2314575"/>
+          </a:xfrm>
+          <a:prstGeom prst="rect">
+            <a:avLst/>
+          </a:prstGeom>
+          <a:noFill/>
+          <a:ln w="9525">
+            <a:noFill/>
+            <a:miter lim="800000"/>
+            <a:headEnd/>
+            <a:tailEnd/>
+          </a:ln>
+        </p:spPr>
+      </p:pic>
+      <p:sp>
+        <p:nvSpPr>
+          <p:cNvPr id="10" name="Right Arrow 9"/>
+          <p:cNvSpPr/>
+          <p:nvPr/>
+        </p:nvSpPr>
+        <p:spPr>
+          <a:xfrm>
+            <a:off x="3635896" y="5373216"/>
+            <a:ext cx="1224136" cy="432048"/>
+          </a:xfrm>
+          <a:prstGeom prst="rightArrow">
+            <a:avLst/>
+          </a:prstGeom>
+        </p:spPr>
+        <p:style>
+          <a:lnRef idx="2">
+            <a:schemeClr val="accent1">
+              <a:shade val="50000"/>
+            </a:schemeClr>
+          </a:lnRef>
+          <a:fillRef idx="1">
+            <a:schemeClr val="accent1"/>
+          </a:fillRef>
+          <a:effectRef idx="0">
+            <a:schemeClr val="accent1"/>
+          </a:effectRef>
+          <a:fontRef idx="minor">
+            <a:schemeClr val="lt1"/>
+          </a:fontRef>
+        </p:style>
+        <p:txBody>
+          <a:bodyPr rtlCol="0" anchor="ctr"/>
+          <a:lstStyle/>
+          <a:p>
+            <a:pPr algn="ctr"/>
+            <a:endParaRPr lang="ru-RU"/>
+          </a:p>
+        </p:txBody>
+      </p:sp>
+      <p:pic>
+        <p:nvPicPr>
+          <p:cNvPr id="1029" name="Picture 5"/>
+          <p:cNvPicPr>
+            <a:picLocks noChangeAspect="1" noChangeArrowheads="1"/>
+          </p:cNvPicPr>
+          <p:nvPr/>
+        </p:nvPicPr>
+        <p:blipFill>
+          <a:blip r:embed="rId4" cstate="print"/>
+          <a:srcRect/>
+          <a:stretch>
+            <a:fillRect/>
+          </a:stretch>
+        </p:blipFill>
+        <p:spPr bwMode="auto">
+          <a:xfrm>
+            <a:off x="5148064" y="4498801"/>
+            <a:ext cx="2649853" cy="2201416"/>
+          </a:xfrm>
+          <a:prstGeom prst="rect">
+            <a:avLst/>
+          </a:prstGeom>
+          <a:noFill/>
+          <a:ln w="9525">
+            <a:noFill/>
+            <a:miter lim="800000"/>
+            <a:headEnd/>
+            <a:tailEnd/>
+          </a:ln>
+        </p:spPr>
+      </p:pic>
+      <p:pic>
+        <p:nvPicPr>
+          <p:cNvPr id="1030" name="Picture 6"/>
+          <p:cNvPicPr>
+            <a:picLocks noChangeAspect="1" noChangeArrowheads="1"/>
+          </p:cNvPicPr>
+          <p:nvPr/>
+        </p:nvPicPr>
+        <p:blipFill>
+          <a:blip r:embed="rId5" cstate="print"/>
+          <a:srcRect/>
+          <a:stretch>
+            <a:fillRect/>
+          </a:stretch>
+        </p:blipFill>
+        <p:spPr bwMode="auto">
+          <a:xfrm>
+            <a:off x="5220072" y="1196752"/>
+            <a:ext cx="2476500" cy="2314575"/>
+          </a:xfrm>
+          <a:prstGeom prst="rect">
+            <a:avLst/>
+          </a:prstGeom>
+          <a:noFill/>
+          <a:ln w="9525">
+            <a:noFill/>
+            <a:miter lim="800000"/>
+            <a:headEnd/>
+            <a:tailEnd/>
+          </a:ln>
+        </p:spPr>
+      </p:pic>
+      <p:sp>
+        <p:nvSpPr>
+          <p:cNvPr id="16" name="Down Arrow 15"/>
+          <p:cNvSpPr/>
+          <p:nvPr/>
+        </p:nvSpPr>
+        <p:spPr>
+          <a:xfrm rot="10800000">
+            <a:off x="6228185" y="3573016"/>
+            <a:ext cx="504056" cy="792088"/>
+          </a:xfrm>
+          <a:prstGeom prst="downArrow">
+            <a:avLst/>
+          </a:prstGeom>
+        </p:spPr>
+        <p:style>
+          <a:lnRef idx="2">
+            <a:schemeClr val="accent1">
+              <a:shade val="50000"/>
+            </a:schemeClr>
+          </a:lnRef>
+          <a:fillRef idx="1">
+            <a:schemeClr val="accent1"/>
+          </a:fillRef>
+          <a:effectRef idx="0">
+            <a:schemeClr val="accent1"/>
+          </a:effectRef>
+          <a:fontRef idx="minor">
+            <a:schemeClr val="lt1"/>
+          </a:fontRef>
+        </p:style>
+        <p:txBody>
+          <a:bodyPr rtlCol="0" anchor="ctr"/>
+          <a:lstStyle/>
+          <a:p>
+            <a:pPr algn="ctr"/>
+            <a:endParaRPr lang="ru-RU"/>
+          </a:p>
+        </p:txBody>
+      </p:sp>
+    </p:spTree>
+  </p:cSld>
+  <p:clrMapOvr>
+    <a:masterClrMapping/>
+  </p:clrMapOvr>
+  <p:transition>
+    <p:fade/>
+  </p:transition>
+  <p:timing>
+    <p:tnLst>
+      <p:par>
+        <p:cTn id="1" dur="indefinite" restart="never" nodeType="tmRoot"/>
+      </p:par>
+    </p:tnLst>
+  </p:timing>
+</p:sld>
+</file>
+
+<file path=ppt/slides/slide4.xml><?xml version="1.0" encoding="utf-8"?>
+<p:sld xmlns:a="http://schemas.openxmlformats.org/drawingml/2006/main" xmlns:r="http://schemas.openxmlformats.org/officeDocument/2006/relationships" xmlns:p="http://schemas.openxmlformats.org/presentationml/2006/main">
+  <p:cSld>
+    <p:spTree>
+      <p:nvGrpSpPr>
+        <p:cNvPr id="1" name=""/>
+        <p:cNvGrpSpPr/>
+        <p:nvPr/>
+      </p:nvGrpSpPr>
+      <p:grpSpPr>
+        <a:xfrm>
+          <a:off x="0" y="0"/>
+          <a:ext cx="0" cy="0"/>
+          <a:chOff x="0" y="0"/>
+          <a:chExt cx="0" cy="0"/>
+        </a:xfrm>
+      </p:grpSpPr>
+      <p:sp>
+        <p:nvSpPr>
+          <p:cNvPr id="2" name="Title 1"/>
+          <p:cNvSpPr>
+            <a:spLocks noGrp="1"/>
+          </p:cNvSpPr>
+          <p:nvPr>
+            <p:ph type="title"/>
+          </p:nvPr>
+        </p:nvSpPr>
         <p:spPr>
           <a:xfrm>
             <a:off x="457200" y="274638"/>
@@ -3817,14 +4452,36 @@
           <a:p>
             <a:pPr algn="ctr"/>
             <a:r>
-              <a:rPr lang="en-US" sz="3700" dirty="0" smtClean="0"/>
-              <a:t>Dependency Injection </a:t>
-            </a:r>
-            <a:r>
-              <a:rPr lang="en-US" sz="3700" dirty="0" smtClean="0"/>
-              <a:t>types by Fowler</a:t>
-            </a:r>
-            <a:endParaRPr lang="ru-RU" sz="3700" dirty="0"/>
+              <a:rPr lang="en-US" sz="4000" dirty="0" smtClean="0">
+                <a:solidFill>
+                  <a:schemeClr val="accent1"/>
+                </a:solidFill>
+                <a:effectLst>
+                  <a:outerShdw blurRad="38100" dist="38100" dir="2700000" algn="tl">
+                    <a:srgbClr val="000000">
+                      <a:alpha val="43137"/>
+                    </a:srgbClr>
+                  </a:outerShdw>
+                </a:effectLst>
+                <a:latin typeface="Calibri" pitchFamily="34" charset="0"/>
+                <a:cs typeface="Calibri" pitchFamily="34" charset="0"/>
+              </a:rPr>
+              <a:t>Dependency Injection types by Fowler</a:t>
+            </a:r>
+            <a:endParaRPr lang="ru-RU" sz="4000" dirty="0">
+              <a:solidFill>
+                <a:schemeClr val="accent1"/>
+              </a:solidFill>
+              <a:effectLst>
+                <a:outerShdw blurRad="38100" dist="38100" dir="2700000" algn="tl">
+                  <a:srgbClr val="000000">
+                    <a:alpha val="43137"/>
+                  </a:srgbClr>
+                </a:outerShdw>
+              </a:effectLst>
+              <a:latin typeface="Calibri" pitchFamily="34" charset="0"/>
+              <a:cs typeface="Calibri" pitchFamily="34" charset="0"/>
+            </a:endParaRPr>
           </a:p>
         </p:txBody>
       </p:sp>
@@ -3846,12 +4503,15 @@
         </p:spPr>
         <p:txBody>
           <a:bodyPr>
-            <a:normAutofit/>
+            <a:noAutofit/>
           </a:bodyPr>
           <a:lstStyle/>
           <a:p>
             <a:r>
-              <a:rPr lang="en-US" sz="2000" dirty="0" smtClean="0"/>
+              <a:rPr lang="en-US" sz="2000" dirty="0" smtClean="0">
+                <a:latin typeface="Times New Roman" pitchFamily="18" charset="0"/>
+                <a:cs typeface="Times New Roman" pitchFamily="18" charset="0"/>
+              </a:rPr>
               <a:t>Constructor injection</a:t>
             </a:r>
           </a:p>
@@ -3945,9 +4605,8 @@
                 <a:effectLst/>
                 <a:uLnTx/>
                 <a:uFillTx/>
-                <a:latin typeface="+mn-lt"/>
-                <a:ea typeface="+mn-ea"/>
-                <a:cs typeface="+mn-cs"/>
+                <a:latin typeface="Times New Roman" pitchFamily="18" charset="0"/>
+                <a:cs typeface="Times New Roman" pitchFamily="18" charset="0"/>
               </a:rPr>
               <a:t>Interface injection</a:t>
             </a:r>
@@ -3961,9 +4620,8 @@
               <a:effectLst/>
               <a:uLnTx/>
               <a:uFillTx/>
-              <a:latin typeface="+mn-lt"/>
-              <a:ea typeface="+mn-ea"/>
-              <a:cs typeface="+mn-cs"/>
+              <a:latin typeface="Times New Roman" pitchFamily="18" charset="0"/>
+              <a:cs typeface="Times New Roman" pitchFamily="18" charset="0"/>
             </a:endParaRPr>
           </a:p>
         </p:txBody>
@@ -4021,9 +4679,8 @@
                 <a:effectLst/>
                 <a:uLnTx/>
                 <a:uFillTx/>
-                <a:latin typeface="+mn-lt"/>
-                <a:ea typeface="+mn-ea"/>
-                <a:cs typeface="+mn-cs"/>
+                <a:latin typeface="Times New Roman" pitchFamily="18" charset="0"/>
+                <a:cs typeface="Times New Roman" pitchFamily="18" charset="0"/>
               </a:rPr>
               <a:t>Setter injection</a:t>
             </a:r>
@@ -4134,88 +4791,16 @@
   <p:clrMapOvr>
     <a:masterClrMapping/>
   </p:clrMapOvr>
-</p:sld>
-</file>
-
-<file path=ppt/slides/slide4.xml><?xml version="1.0" encoding="utf-8"?>
-<p:sld xmlns:a="http://schemas.openxmlformats.org/drawingml/2006/main" xmlns:r="http://schemas.openxmlformats.org/officeDocument/2006/relationships" xmlns:p="http://schemas.openxmlformats.org/presentationml/2006/main">
-  <p:cSld>
-    <p:spTree>
-      <p:nvGrpSpPr>
-        <p:cNvPr id="1" name=""/>
-        <p:cNvGrpSpPr/>
-        <p:nvPr/>
-      </p:nvGrpSpPr>
-      <p:grpSpPr>
-        <a:xfrm>
-          <a:off x="0" y="0"/>
-          <a:ext cx="0" cy="0"/>
-          <a:chOff x="0" y="0"/>
-          <a:chExt cx="0" cy="0"/>
-        </a:xfrm>
-      </p:grpSpPr>
-      <p:sp>
-        <p:nvSpPr>
-          <p:cNvPr id="2" name="Title 1"/>
-          <p:cNvSpPr>
-            <a:spLocks noGrp="1"/>
-          </p:cNvSpPr>
-          <p:nvPr>
-            <p:ph type="title"/>
-          </p:nvPr>
-        </p:nvSpPr>
-        <p:spPr/>
-        <p:txBody>
-          <a:bodyPr>
-            <a:normAutofit/>
-          </a:bodyPr>
-          <a:lstStyle/>
-          <a:p>
-            <a:r>
-              <a:rPr lang="en-US" sz="3700" dirty="0" smtClean="0"/>
-              <a:t>Strongly coupled code</a:t>
-            </a:r>
-            <a:endParaRPr lang="ru-RU" sz="3700" dirty="0"/>
-          </a:p>
-        </p:txBody>
-      </p:sp>
-      <p:pic>
-        <p:nvPicPr>
-          <p:cNvPr id="2051" name="Picture 3"/>
-          <p:cNvPicPr>
-            <a:picLocks noChangeAspect="1" noChangeArrowheads="1"/>
-          </p:cNvPicPr>
-          <p:nvPr/>
-        </p:nvPicPr>
-        <p:blipFill>
-          <a:blip r:embed="rId2" cstate="print"/>
-          <a:srcRect/>
-          <a:stretch>
-            <a:fillRect/>
-          </a:stretch>
-        </p:blipFill>
-        <p:spPr bwMode="auto">
-          <a:xfrm>
-            <a:off x="523453" y="1258019"/>
-            <a:ext cx="7000875" cy="5267325"/>
-          </a:xfrm>
-          <a:prstGeom prst="rect">
-            <a:avLst/>
-          </a:prstGeom>
-          <a:noFill/>
-          <a:ln w="9525">
-            <a:noFill/>
-            <a:miter lim="800000"/>
-            <a:headEnd/>
-            <a:tailEnd/>
-          </a:ln>
-        </p:spPr>
-      </p:pic>
-    </p:spTree>
-  </p:cSld>
-  <p:clrMapOvr>
-    <a:masterClrMapping/>
-  </p:clrMapOvr>
+  <p:transition>
+    <p:fade/>
+  </p:transition>
+  <p:timing>
+    <p:tnLst>
+      <p:par>
+        <p:cTn id="1" dur="indefinite" restart="never" nodeType="tmRoot"/>
+      </p:par>
+    </p:tnLst>
+  </p:timing>
 </p:sld>
 </file>
 
@@ -4253,15 +4838,157 @@
           </a:bodyPr>
           <a:lstStyle/>
           <a:p>
-            <a:r>
-              <a:rPr lang="en-US" sz="3700" dirty="0" smtClean="0"/>
-              <a:t>Example with dependency </a:t>
-            </a:r>
-            <a:r>
-              <a:rPr lang="en-US" sz="3700" dirty="0" smtClean="0"/>
-              <a:t>injection </a:t>
-            </a:r>
-            <a:endParaRPr lang="ru-RU" sz="3700" dirty="0"/>
+            <a:pPr algn="ctr"/>
+            <a:r>
+              <a:rPr lang="en-US" sz="4000" dirty="0" smtClean="0">
+                <a:solidFill>
+                  <a:schemeClr val="accent1"/>
+                </a:solidFill>
+                <a:effectLst>
+                  <a:outerShdw blurRad="38100" dist="38100" dir="2700000" algn="tl">
+                    <a:srgbClr val="000000">
+                      <a:alpha val="43137"/>
+                    </a:srgbClr>
+                  </a:outerShdw>
+                </a:effectLst>
+                <a:latin typeface="Calibri" pitchFamily="34" charset="0"/>
+                <a:cs typeface="Calibri" pitchFamily="34" charset="0"/>
+              </a:rPr>
+              <a:t>Strongly coupled code</a:t>
+            </a:r>
+            <a:endParaRPr lang="ru-RU" sz="4000" dirty="0">
+              <a:solidFill>
+                <a:schemeClr val="accent1"/>
+              </a:solidFill>
+              <a:effectLst>
+                <a:outerShdw blurRad="38100" dist="38100" dir="2700000" algn="tl">
+                  <a:srgbClr val="000000">
+                    <a:alpha val="43137"/>
+                  </a:srgbClr>
+                </a:outerShdw>
+              </a:effectLst>
+              <a:latin typeface="Calibri" pitchFamily="34" charset="0"/>
+              <a:cs typeface="Calibri" pitchFamily="34" charset="0"/>
+            </a:endParaRPr>
+          </a:p>
+        </p:txBody>
+      </p:sp>
+      <p:pic>
+        <p:nvPicPr>
+          <p:cNvPr id="2051" name="Picture 3"/>
+          <p:cNvPicPr>
+            <a:picLocks noChangeAspect="1" noChangeArrowheads="1"/>
+          </p:cNvPicPr>
+          <p:nvPr/>
+        </p:nvPicPr>
+        <p:blipFill>
+          <a:blip r:embed="rId2" cstate="print"/>
+          <a:srcRect/>
+          <a:stretch>
+            <a:fillRect/>
+          </a:stretch>
+        </p:blipFill>
+        <p:spPr bwMode="auto">
+          <a:xfrm>
+            <a:off x="971600" y="1258019"/>
+            <a:ext cx="7000875" cy="5267325"/>
+          </a:xfrm>
+          <a:prstGeom prst="rect">
+            <a:avLst/>
+          </a:prstGeom>
+          <a:noFill/>
+          <a:ln w="9525">
+            <a:noFill/>
+            <a:miter lim="800000"/>
+            <a:headEnd/>
+            <a:tailEnd/>
+          </a:ln>
+        </p:spPr>
+      </p:pic>
+    </p:spTree>
+  </p:cSld>
+  <p:clrMapOvr>
+    <a:masterClrMapping/>
+  </p:clrMapOvr>
+  <p:transition>
+    <p:fade/>
+  </p:transition>
+  <p:timing>
+    <p:tnLst>
+      <p:par>
+        <p:cTn id="1" dur="indefinite" restart="never" nodeType="tmRoot"/>
+      </p:par>
+    </p:tnLst>
+  </p:timing>
+</p:sld>
+</file>
+
+<file path=ppt/slides/slide6.xml><?xml version="1.0" encoding="utf-8"?>
+<p:sld xmlns:a="http://schemas.openxmlformats.org/drawingml/2006/main" xmlns:r="http://schemas.openxmlformats.org/officeDocument/2006/relationships" xmlns:p="http://schemas.openxmlformats.org/presentationml/2006/main">
+  <p:cSld>
+    <p:spTree>
+      <p:nvGrpSpPr>
+        <p:cNvPr id="1" name=""/>
+        <p:cNvGrpSpPr/>
+        <p:nvPr/>
+      </p:nvGrpSpPr>
+      <p:grpSpPr>
+        <a:xfrm>
+          <a:off x="0" y="0"/>
+          <a:ext cx="0" cy="0"/>
+          <a:chOff x="0" y="0"/>
+          <a:chExt cx="0" cy="0"/>
+        </a:xfrm>
+      </p:grpSpPr>
+      <p:sp>
+        <p:nvSpPr>
+          <p:cNvPr id="2" name="Title 1"/>
+          <p:cNvSpPr>
+            <a:spLocks noGrp="1"/>
+          </p:cNvSpPr>
+          <p:nvPr>
+            <p:ph type="title"/>
+          </p:nvPr>
+        </p:nvSpPr>
+        <p:spPr/>
+        <p:txBody>
+          <a:bodyPr>
+            <a:normAutofit/>
+          </a:bodyPr>
+          <a:lstStyle/>
+          <a:p>
+            <a:pPr algn="ctr"/>
+            <a:r>
+              <a:rPr lang="en-US" sz="4000" dirty="0" smtClean="0">
+                <a:solidFill>
+                  <a:schemeClr val="accent1"/>
+                </a:solidFill>
+                <a:effectLst>
+                  <a:outerShdw blurRad="38100" dist="38100" dir="2700000" algn="tl">
+                    <a:srgbClr val="000000">
+                      <a:alpha val="43137"/>
+                    </a:srgbClr>
+                  </a:outerShdw>
+                </a:effectLst>
+                <a:latin typeface="Calibri" pitchFamily="34" charset="0"/>
+                <a:cs typeface="Calibri" pitchFamily="34" charset="0"/>
+              </a:rPr>
+              <a:t>Example with dependency injection </a:t>
+            </a:r>
+            <a:endParaRPr lang="ru-RU" sz="4000" dirty="0">
+              <a:solidFill>
+                <a:schemeClr val="accent1"/>
+              </a:solidFill>
+              <a:effectLst>
+                <a:outerShdw blurRad="38100" dist="38100" dir="2700000" algn="tl">
+                  <a:srgbClr val="000000">
+                    <a:alpha val="43137"/>
+                  </a:srgbClr>
+                </a:outerShdw>
+              </a:effectLst>
+              <a:latin typeface="Calibri" pitchFamily="34" charset="0"/>
+              <a:cs typeface="Calibri" pitchFamily="34" charset="0"/>
+            </a:endParaRPr>
           </a:p>
         </p:txBody>
       </p:sp>
@@ -4304,10 +5031,20 @@
   <p:clrMapOvr>
     <a:masterClrMapping/>
   </p:clrMapOvr>
+  <p:transition>
+    <p:fade/>
+  </p:transition>
+  <p:timing>
+    <p:tnLst>
+      <p:par>
+        <p:cTn id="1" dur="indefinite" restart="never" nodeType="tmRoot"/>
+      </p:par>
+    </p:tnLst>
+  </p:timing>
 </p:sld>
 </file>
 
-<file path=ppt/slides/slide6.xml><?xml version="1.0" encoding="utf-8"?>
+<file path=ppt/slides/slide7.xml><?xml version="1.0" encoding="utf-8"?>
 <p:sld xmlns:a="http://schemas.openxmlformats.org/drawingml/2006/main" xmlns:r="http://schemas.openxmlformats.org/officeDocument/2006/relationships" xmlns:p="http://schemas.openxmlformats.org/presentationml/2006/main">
   <p:cSld>
     <p:spTree>
@@ -4341,11 +5078,38 @@
           </a:bodyPr>
           <a:lstStyle/>
           <a:p>
-            <a:r>
-              <a:rPr lang="en-US" sz="3700" dirty="0" smtClean="0"/>
+            <a:pPr algn="ctr"/>
+            <a:r>
+              <a:rPr lang="en-US" sz="3700" dirty="0" smtClean="0">
+                <a:solidFill>
+                  <a:schemeClr val="accent1"/>
+                </a:solidFill>
+                <a:effectLst>
+                  <a:outerShdw blurRad="38100" dist="38100" dir="2700000" algn="tl">
+                    <a:srgbClr val="000000">
+                      <a:alpha val="43137"/>
+                    </a:srgbClr>
+                  </a:outerShdw>
+                </a:effectLst>
+                <a:latin typeface="Calibri" pitchFamily="34" charset="0"/>
+                <a:cs typeface="Calibri" pitchFamily="34" charset="0"/>
+              </a:rPr>
               <a:t>Poor man’s dependency injection</a:t>
             </a:r>
-            <a:endParaRPr lang="ru-RU" sz="3700" dirty="0"/>
+            <a:endParaRPr lang="ru-RU" sz="3700" dirty="0">
+              <a:solidFill>
+                <a:schemeClr val="accent1"/>
+              </a:solidFill>
+              <a:effectLst>
+                <a:outerShdw blurRad="38100" dist="38100" dir="2700000" algn="tl">
+                  <a:srgbClr val="000000">
+                    <a:alpha val="43137"/>
+                  </a:srgbClr>
+                </a:outerShdw>
+              </a:effectLst>
+              <a:latin typeface="Calibri" pitchFamily="34" charset="0"/>
+              <a:cs typeface="Calibri" pitchFamily="34" charset="0"/>
+            </a:endParaRPr>
           </a:p>
         </p:txBody>
       </p:sp>
@@ -4386,156 +5150,16 @@
   <p:clrMapOvr>
     <a:masterClrMapping/>
   </p:clrMapOvr>
-</p:sld>
-</file>
-
-<file path=ppt/slides/slide7.xml><?xml version="1.0" encoding="utf-8"?>
-<p:sld xmlns:a="http://schemas.openxmlformats.org/drawingml/2006/main" xmlns:r="http://schemas.openxmlformats.org/officeDocument/2006/relationships" xmlns:p="http://schemas.openxmlformats.org/presentationml/2006/main">
-  <p:cSld>
-    <p:spTree>
-      <p:nvGrpSpPr>
-        <p:cNvPr id="1" name=""/>
-        <p:cNvGrpSpPr/>
-        <p:nvPr/>
-      </p:nvGrpSpPr>
-      <p:grpSpPr>
-        <a:xfrm>
-          <a:off x="0" y="0"/>
-          <a:ext cx="0" cy="0"/>
-          <a:chOff x="0" y="0"/>
-          <a:chExt cx="0" cy="0"/>
-        </a:xfrm>
-      </p:grpSpPr>
-      <p:sp>
-        <p:nvSpPr>
-          <p:cNvPr id="2" name="Title 1"/>
-          <p:cNvSpPr>
-            <a:spLocks noGrp="1"/>
-          </p:cNvSpPr>
-          <p:nvPr>
-            <p:ph type="title"/>
-          </p:nvPr>
-        </p:nvSpPr>
-        <p:spPr>
-          <a:xfrm>
-            <a:off x="457200" y="274638"/>
-            <a:ext cx="8363272" cy="1143000"/>
-          </a:xfrm>
-        </p:spPr>
-        <p:txBody>
-          <a:bodyPr>
-            <a:noAutofit/>
-          </a:bodyPr>
-          <a:lstStyle/>
-          <a:p>
-            <a:pPr algn="ctr"/>
-            <a:r>
-              <a:rPr lang="en-US" sz="3700" dirty="0" err="1" smtClean="0"/>
-              <a:t>.</a:t>
-            </a:r>
-            <a:r>
-              <a:rPr lang="en-US" sz="3700" dirty="0" err="1" smtClean="0"/>
-              <a:t>Net</a:t>
-            </a:r>
-            <a:r>
-              <a:rPr lang="en-US" sz="3700" dirty="0" smtClean="0"/>
-              <a:t> dependency injection containers</a:t>
-            </a:r>
-            <a:endParaRPr lang="ru-RU" sz="3700" dirty="0"/>
-          </a:p>
-        </p:txBody>
-      </p:sp>
-      <p:sp>
-        <p:nvSpPr>
-          <p:cNvPr id="3" name="Content Placeholder 2"/>
-          <p:cNvSpPr>
-            <a:spLocks noGrp="1"/>
-          </p:cNvSpPr>
-          <p:nvPr>
-            <p:ph idx="1"/>
-          </p:nvPr>
-        </p:nvSpPr>
-        <p:spPr/>
-        <p:txBody>
-          <a:bodyPr>
-            <a:normAutofit fontScale="92500" lnSpcReduction="10000"/>
-          </a:bodyPr>
-          <a:lstStyle/>
-          <a:p>
-            <a:r>
-              <a:rPr lang="en-US" dirty="0" err="1" smtClean="0"/>
-              <a:t>Autofac</a:t>
-            </a:r>
-            <a:endParaRPr lang="en-US" dirty="0" smtClean="0"/>
-          </a:p>
-          <a:p>
-            <a:r>
-              <a:rPr lang="en-US" dirty="0" smtClean="0"/>
-              <a:t>Castle </a:t>
-            </a:r>
-            <a:r>
-              <a:rPr lang="en-US" dirty="0" err="1" smtClean="0"/>
-              <a:t>MicroKernel</a:t>
-            </a:r>
-            <a:r>
-              <a:rPr lang="en-US" dirty="0" smtClean="0"/>
-              <a:t>/Windsor</a:t>
-            </a:r>
-          </a:p>
-          <a:p>
-            <a:r>
-              <a:rPr lang="en-US" dirty="0" err="1" smtClean="0"/>
-              <a:t>ObjectBuilder</a:t>
-            </a:r>
-            <a:endParaRPr lang="en-US" dirty="0" smtClean="0"/>
-          </a:p>
-          <a:p>
-            <a:r>
-              <a:rPr lang="en-US" dirty="0" smtClean="0"/>
-              <a:t>PicoContainer.NET</a:t>
-            </a:r>
-          </a:p>
-          <a:p>
-            <a:r>
-              <a:rPr lang="en-US" dirty="0" err="1" smtClean="0"/>
-              <a:t>Puzzle.NFactory</a:t>
-            </a:r>
-            <a:endParaRPr lang="en-US" dirty="0" smtClean="0"/>
-          </a:p>
-          <a:p>
-            <a:r>
-              <a:rPr lang="en-US" dirty="0" smtClean="0"/>
-              <a:t>Spring.NET</a:t>
-            </a:r>
-          </a:p>
-          <a:p>
-            <a:r>
-              <a:rPr lang="en-US" dirty="0" err="1" smtClean="0"/>
-              <a:t>StructureMap</a:t>
-            </a:r>
-            <a:endParaRPr lang="en-US" dirty="0" smtClean="0"/>
-          </a:p>
-          <a:p>
-            <a:r>
-              <a:rPr lang="en-US" dirty="0" err="1" smtClean="0"/>
-              <a:t>Ninject</a:t>
-            </a:r>
-            <a:endParaRPr lang="en-US" dirty="0" smtClean="0"/>
-          </a:p>
-          <a:p>
-            <a:r>
-              <a:rPr lang="en-US" dirty="0" smtClean="0"/>
-              <a:t>Unity</a:t>
-            </a:r>
-            <a:endParaRPr lang="ru-RU" dirty="0"/>
-          </a:p>
-        </p:txBody>
-      </p:sp>
-    </p:spTree>
-  </p:cSld>
-  <p:clrMapOvr>
-    <a:masterClrMapping/>
-  </p:clrMapOvr>
+  <p:transition>
+    <p:fade/>
+  </p:transition>
+  <p:timing>
+    <p:tnLst>
+      <p:par>
+        <p:cTn id="1" dur="indefinite" restart="never" nodeType="tmRoot"/>
+      </p:par>
+    </p:tnLst>
+  </p:timing>
 </p:sld>
 </file>
 
@@ -4566,7 +5190,12 @@
             <p:ph type="title"/>
           </p:nvPr>
         </p:nvSpPr>
-        <p:spPr/>
+        <p:spPr>
+          <a:xfrm>
+            <a:off x="457200" y="274638"/>
+            <a:ext cx="8291264" cy="1143000"/>
+          </a:xfrm>
+        </p:spPr>
         <p:txBody>
           <a:bodyPr>
             <a:normAutofit/>
@@ -4575,87 +5204,381 @@
           <a:p>
             <a:pPr algn="ctr"/>
             <a:r>
-              <a:rPr lang="en-US" sz="3700" dirty="0" smtClean="0"/>
-              <a:t>Modern </a:t>
-            </a:r>
-            <a:r>
-              <a:rPr lang="en-US" sz="3700" dirty="0" err="1" smtClean="0"/>
-              <a:t>.Net</a:t>
-            </a:r>
-            <a:r>
-              <a:rPr lang="en-US" sz="3700" dirty="0" smtClean="0"/>
-              <a:t> containers’ features</a:t>
-            </a:r>
-            <a:endParaRPr lang="ru-RU" sz="3700" dirty="0"/>
-          </a:p>
-        </p:txBody>
-      </p:sp>
-      <p:sp>
-        <p:nvSpPr>
-          <p:cNvPr id="3" name="Content Placeholder 2"/>
-          <p:cNvSpPr>
-            <a:spLocks noGrp="1"/>
-          </p:cNvSpPr>
-          <p:nvPr>
-            <p:ph idx="1"/>
-          </p:nvPr>
-        </p:nvSpPr>
-        <p:spPr/>
-        <p:txBody>
-          <a:bodyPr/>
-          <a:lstStyle/>
-          <a:p>
-            <a:pPr>
-              <a:lnSpc>
-                <a:spcPct val="150000"/>
-              </a:lnSpc>
-            </a:pPr>
-            <a:r>
-              <a:rPr lang="en-US" dirty="0" smtClean="0"/>
-              <a:t>Instance lifecycle management</a:t>
-            </a:r>
-          </a:p>
-          <a:p>
-            <a:pPr>
-              <a:lnSpc>
-                <a:spcPct val="150000"/>
-              </a:lnSpc>
-            </a:pPr>
-            <a:r>
-              <a:rPr lang="en-US" dirty="0" smtClean="0"/>
-              <a:t>Configuration through code using DSL</a:t>
-            </a:r>
-          </a:p>
-          <a:p>
-            <a:pPr>
-              <a:lnSpc>
-                <a:spcPct val="150000"/>
-              </a:lnSpc>
-            </a:pPr>
-            <a:r>
-              <a:rPr lang="en-US" dirty="0" smtClean="0"/>
-              <a:t>Auto configuration using conventions</a:t>
-            </a:r>
-          </a:p>
-          <a:p>
-            <a:pPr>
-              <a:lnSpc>
-                <a:spcPct val="150000"/>
-              </a:lnSpc>
-            </a:pPr>
-            <a:r>
-              <a:rPr lang="en-US" dirty="0" err="1" smtClean="0"/>
-              <a:t>Automocking</a:t>
-            </a:r>
-            <a:endParaRPr lang="ru-RU" dirty="0"/>
-          </a:p>
-        </p:txBody>
-      </p:sp>
+              <a:rPr lang="en-US" sz="4000" dirty="0" smtClean="0">
+                <a:solidFill>
+                  <a:schemeClr val="accent1"/>
+                </a:solidFill>
+                <a:effectLst>
+                  <a:outerShdw blurRad="38100" dist="38100" dir="2700000" algn="tl">
+                    <a:srgbClr val="000000">
+                      <a:alpha val="43137"/>
+                    </a:srgbClr>
+                  </a:outerShdw>
+                </a:effectLst>
+                <a:latin typeface="Calibri" pitchFamily="34" charset="0"/>
+                <a:cs typeface="Calibri" pitchFamily="34" charset="0"/>
+              </a:rPr>
+              <a:t>Manual Dependency Injection</a:t>
+            </a:r>
+            <a:endParaRPr lang="ru-RU" sz="4000" dirty="0">
+              <a:solidFill>
+                <a:schemeClr val="accent1"/>
+              </a:solidFill>
+              <a:effectLst>
+                <a:outerShdw blurRad="38100" dist="38100" dir="2700000" algn="tl">
+                  <a:srgbClr val="000000">
+                    <a:alpha val="43137"/>
+                  </a:srgbClr>
+                </a:outerShdw>
+              </a:effectLst>
+              <a:latin typeface="Calibri" pitchFamily="34" charset="0"/>
+              <a:cs typeface="Calibri" pitchFamily="34" charset="0"/>
+            </a:endParaRPr>
+          </a:p>
+        </p:txBody>
+      </p:sp>
+      <p:pic>
+        <p:nvPicPr>
+          <p:cNvPr id="2050" name="Picture 2"/>
+          <p:cNvPicPr>
+            <a:picLocks noChangeAspect="1" noChangeArrowheads="1"/>
+          </p:cNvPicPr>
+          <p:nvPr/>
+        </p:nvPicPr>
+        <p:blipFill>
+          <a:blip r:embed="rId2" cstate="print"/>
+          <a:srcRect/>
+          <a:stretch>
+            <a:fillRect/>
+          </a:stretch>
+        </p:blipFill>
+        <p:spPr bwMode="auto">
+          <a:xfrm>
+            <a:off x="755576" y="1196752"/>
+            <a:ext cx="7210703" cy="5433417"/>
+          </a:xfrm>
+          <a:prstGeom prst="rect">
+            <a:avLst/>
+          </a:prstGeom>
+          <a:noFill/>
+          <a:ln w="9525">
+            <a:noFill/>
+            <a:miter lim="800000"/>
+            <a:headEnd/>
+            <a:tailEnd/>
+          </a:ln>
+        </p:spPr>
+      </p:pic>
     </p:spTree>
   </p:cSld>
   <p:clrMapOvr>
     <a:masterClrMapping/>
   </p:clrMapOvr>
+  <p:transition>
+    <p:fade/>
+  </p:transition>
+  <p:timing>
+    <p:tnLst>
+      <p:par>
+        <p:cTn id="1" dur="indefinite" restart="never" nodeType="tmRoot"/>
+      </p:par>
+    </p:tnLst>
+  </p:timing>
+</p:sld>
+</file>
+
+<file path=ppt/slides/slide9.xml><?xml version="1.0" encoding="utf-8"?>
+<p:sld xmlns:a="http://schemas.openxmlformats.org/drawingml/2006/main" xmlns:r="http://schemas.openxmlformats.org/officeDocument/2006/relationships" xmlns:p="http://schemas.openxmlformats.org/presentationml/2006/main">
+  <p:cSld>
+    <p:spTree>
+      <p:nvGrpSpPr>
+        <p:cNvPr id="1" name=""/>
+        <p:cNvGrpSpPr/>
+        <p:nvPr/>
+      </p:nvGrpSpPr>
+      <p:grpSpPr>
+        <a:xfrm>
+          <a:off x="0" y="0"/>
+          <a:ext cx="0" cy="0"/>
+          <a:chOff x="0" y="0"/>
+          <a:chExt cx="0" cy="0"/>
+        </a:xfrm>
+      </p:grpSpPr>
+      <p:sp>
+        <p:nvSpPr>
+          <p:cNvPr id="2" name="Title 1"/>
+          <p:cNvSpPr>
+            <a:spLocks noGrp="1"/>
+          </p:cNvSpPr>
+          <p:nvPr>
+            <p:ph type="title"/>
+          </p:nvPr>
+        </p:nvSpPr>
+        <p:spPr>
+          <a:xfrm>
+            <a:off x="457200" y="274638"/>
+            <a:ext cx="8363272" cy="1143000"/>
+          </a:xfrm>
+        </p:spPr>
+        <p:txBody>
+          <a:bodyPr>
+            <a:noAutofit/>
+          </a:bodyPr>
+          <a:lstStyle/>
+          <a:p>
+            <a:pPr algn="ctr"/>
+            <a:r>
+              <a:rPr lang="en-US" sz="3700" dirty="0" err="1" smtClean="0">
+                <a:solidFill>
+                  <a:schemeClr val="accent1"/>
+                </a:solidFill>
+                <a:effectLst>
+                  <a:outerShdw blurRad="38100" dist="38100" dir="2700000" algn="tl">
+                    <a:srgbClr val="000000">
+                      <a:alpha val="43137"/>
+                    </a:srgbClr>
+                  </a:outerShdw>
+                </a:effectLst>
+              </a:rPr>
+              <a:t>.</a:t>
+            </a:r>
+            <a:r>
+              <a:rPr lang="en-US" sz="3700" dirty="0" err="1" smtClean="0">
+                <a:solidFill>
+                  <a:schemeClr val="accent1"/>
+                </a:solidFill>
+                <a:effectLst>
+                  <a:outerShdw blurRad="38100" dist="38100" dir="2700000" algn="tl">
+                    <a:srgbClr val="000000">
+                      <a:alpha val="43137"/>
+                    </a:srgbClr>
+                  </a:outerShdw>
+                </a:effectLst>
+                <a:latin typeface="Calibri" pitchFamily="34" charset="0"/>
+                <a:cs typeface="Calibri" pitchFamily="34" charset="0"/>
+              </a:rPr>
+              <a:t>Net</a:t>
+            </a:r>
+            <a:r>
+              <a:rPr lang="en-US" sz="3700" dirty="0" smtClean="0">
+                <a:solidFill>
+                  <a:schemeClr val="accent1"/>
+                </a:solidFill>
+                <a:effectLst>
+                  <a:outerShdw blurRad="38100" dist="38100" dir="2700000" algn="tl">
+                    <a:srgbClr val="000000">
+                      <a:alpha val="43137"/>
+                    </a:srgbClr>
+                  </a:outerShdw>
+                </a:effectLst>
+                <a:latin typeface="Calibri" pitchFamily="34" charset="0"/>
+                <a:cs typeface="Calibri" pitchFamily="34" charset="0"/>
+              </a:rPr>
+              <a:t> </a:t>
+            </a:r>
+            <a:r>
+              <a:rPr lang="en-US" sz="4000" dirty="0" smtClean="0">
+                <a:solidFill>
+                  <a:schemeClr val="accent1"/>
+                </a:solidFill>
+                <a:effectLst>
+                  <a:outerShdw blurRad="38100" dist="38100" dir="2700000" algn="tl">
+                    <a:srgbClr val="000000">
+                      <a:alpha val="43137"/>
+                    </a:srgbClr>
+                  </a:outerShdw>
+                </a:effectLst>
+                <a:latin typeface="Calibri" pitchFamily="34" charset="0"/>
+                <a:cs typeface="Calibri" pitchFamily="34" charset="0"/>
+              </a:rPr>
+              <a:t>dependency</a:t>
+            </a:r>
+            <a:r>
+              <a:rPr lang="en-US" sz="3700" dirty="0" smtClean="0">
+                <a:solidFill>
+                  <a:schemeClr val="accent1"/>
+                </a:solidFill>
+                <a:effectLst>
+                  <a:outerShdw blurRad="38100" dist="38100" dir="2700000" algn="tl">
+                    <a:srgbClr val="000000">
+                      <a:alpha val="43137"/>
+                    </a:srgbClr>
+                  </a:outerShdw>
+                </a:effectLst>
+                <a:latin typeface="Calibri" pitchFamily="34" charset="0"/>
+                <a:cs typeface="Calibri" pitchFamily="34" charset="0"/>
+              </a:rPr>
+              <a:t> injection containers</a:t>
+            </a:r>
+            <a:endParaRPr lang="ru-RU" sz="3700" dirty="0">
+              <a:solidFill>
+                <a:schemeClr val="accent1"/>
+              </a:solidFill>
+              <a:effectLst>
+                <a:outerShdw blurRad="38100" dist="38100" dir="2700000" algn="tl">
+                  <a:srgbClr val="000000">
+                    <a:alpha val="43137"/>
+                  </a:srgbClr>
+                </a:outerShdw>
+              </a:effectLst>
+              <a:latin typeface="Calibri" pitchFamily="34" charset="0"/>
+              <a:cs typeface="Calibri" pitchFamily="34" charset="0"/>
+            </a:endParaRPr>
+          </a:p>
+        </p:txBody>
+      </p:sp>
+      <p:sp>
+        <p:nvSpPr>
+          <p:cNvPr id="3" name="Content Placeholder 2"/>
+          <p:cNvSpPr>
+            <a:spLocks noGrp="1"/>
+          </p:cNvSpPr>
+          <p:nvPr>
+            <p:ph idx="1"/>
+          </p:nvPr>
+        </p:nvSpPr>
+        <p:spPr/>
+        <p:txBody>
+          <a:bodyPr>
+            <a:normAutofit fontScale="92500" lnSpcReduction="10000"/>
+          </a:bodyPr>
+          <a:lstStyle/>
+          <a:p>
+            <a:r>
+              <a:rPr lang="en-US" dirty="0" err="1" smtClean="0">
+                <a:latin typeface="Times New Roman" pitchFamily="18" charset="0"/>
+                <a:cs typeface="Times New Roman" pitchFamily="18" charset="0"/>
+              </a:rPr>
+              <a:t>Autofac</a:t>
+            </a:r>
+            <a:endParaRPr lang="en-US" dirty="0" smtClean="0">
+              <a:latin typeface="Times New Roman" pitchFamily="18" charset="0"/>
+              <a:cs typeface="Times New Roman" pitchFamily="18" charset="0"/>
+            </a:endParaRPr>
+          </a:p>
+          <a:p>
+            <a:r>
+              <a:rPr lang="en-US" dirty="0" smtClean="0">
+                <a:latin typeface="Times New Roman" pitchFamily="18" charset="0"/>
+                <a:cs typeface="Times New Roman" pitchFamily="18" charset="0"/>
+              </a:rPr>
+              <a:t>Castle </a:t>
+            </a:r>
+            <a:r>
+              <a:rPr lang="en-US" dirty="0" err="1" smtClean="0">
+                <a:latin typeface="Times New Roman" pitchFamily="18" charset="0"/>
+                <a:cs typeface="Times New Roman" pitchFamily="18" charset="0"/>
+              </a:rPr>
+              <a:t>MicroKernel</a:t>
+            </a:r>
+            <a:r>
+              <a:rPr lang="en-US" dirty="0" smtClean="0">
+                <a:latin typeface="Times New Roman" pitchFamily="18" charset="0"/>
+                <a:cs typeface="Times New Roman" pitchFamily="18" charset="0"/>
+              </a:rPr>
+              <a:t>/Windsor</a:t>
+            </a:r>
+          </a:p>
+          <a:p>
+            <a:r>
+              <a:rPr lang="en-US" dirty="0" err="1" smtClean="0">
+                <a:latin typeface="Times New Roman" pitchFamily="18" charset="0"/>
+                <a:cs typeface="Times New Roman" pitchFamily="18" charset="0"/>
+              </a:rPr>
+              <a:t>ObjectBuilder</a:t>
+            </a:r>
+            <a:endParaRPr lang="en-US" dirty="0" smtClean="0">
+              <a:latin typeface="Times New Roman" pitchFamily="18" charset="0"/>
+              <a:cs typeface="Times New Roman" pitchFamily="18" charset="0"/>
+            </a:endParaRPr>
+          </a:p>
+          <a:p>
+            <a:r>
+              <a:rPr lang="en-US" dirty="0" smtClean="0">
+                <a:latin typeface="Times New Roman" pitchFamily="18" charset="0"/>
+                <a:cs typeface="Times New Roman" pitchFamily="18" charset="0"/>
+              </a:rPr>
+              <a:t>PicoContainer.NET</a:t>
+            </a:r>
+          </a:p>
+          <a:p>
+            <a:r>
+              <a:rPr lang="en-US" dirty="0" err="1" smtClean="0">
+                <a:latin typeface="Times New Roman" pitchFamily="18" charset="0"/>
+                <a:cs typeface="Times New Roman" pitchFamily="18" charset="0"/>
+              </a:rPr>
+              <a:t>Puzzle.NFactory</a:t>
+            </a:r>
+            <a:endParaRPr lang="en-US" dirty="0" smtClean="0">
+              <a:latin typeface="Times New Roman" pitchFamily="18" charset="0"/>
+              <a:cs typeface="Times New Roman" pitchFamily="18" charset="0"/>
+            </a:endParaRPr>
+          </a:p>
+          <a:p>
+            <a:r>
+              <a:rPr lang="en-US" dirty="0" smtClean="0">
+                <a:latin typeface="Times New Roman" pitchFamily="18" charset="0"/>
+                <a:cs typeface="Times New Roman" pitchFamily="18" charset="0"/>
+              </a:rPr>
+              <a:t>Spring.NET</a:t>
+            </a:r>
+          </a:p>
+          <a:p>
+            <a:r>
+              <a:rPr lang="en-US" dirty="0" err="1" smtClean="0">
+                <a:latin typeface="Times New Roman" pitchFamily="18" charset="0"/>
+                <a:cs typeface="Times New Roman" pitchFamily="18" charset="0"/>
+              </a:rPr>
+              <a:t>StructureMap</a:t>
+            </a:r>
+            <a:endParaRPr lang="en-US" dirty="0" smtClean="0">
+              <a:latin typeface="Times New Roman" pitchFamily="18" charset="0"/>
+              <a:cs typeface="Times New Roman" pitchFamily="18" charset="0"/>
+            </a:endParaRPr>
+          </a:p>
+          <a:p>
+            <a:r>
+              <a:rPr lang="en-US" dirty="0" err="1" smtClean="0">
+                <a:latin typeface="Times New Roman" pitchFamily="18" charset="0"/>
+                <a:cs typeface="Times New Roman" pitchFamily="18" charset="0"/>
+              </a:rPr>
+              <a:t>Ninject</a:t>
+            </a:r>
+            <a:endParaRPr lang="en-US" dirty="0" smtClean="0">
+              <a:latin typeface="Times New Roman" pitchFamily="18" charset="0"/>
+              <a:cs typeface="Times New Roman" pitchFamily="18" charset="0"/>
+            </a:endParaRPr>
+          </a:p>
+          <a:p>
+            <a:r>
+              <a:rPr lang="en-US" dirty="0" smtClean="0">
+                <a:latin typeface="Times New Roman" pitchFamily="18" charset="0"/>
+                <a:cs typeface="Times New Roman" pitchFamily="18" charset="0"/>
+              </a:rPr>
+              <a:t>Unity</a:t>
+            </a:r>
+            <a:endParaRPr lang="ru-RU" dirty="0">
+              <a:latin typeface="Times New Roman" pitchFamily="18" charset="0"/>
+              <a:cs typeface="Times New Roman" pitchFamily="18" charset="0"/>
+            </a:endParaRPr>
+          </a:p>
+        </p:txBody>
+      </p:sp>
+    </p:spTree>
+  </p:cSld>
+  <p:clrMapOvr>
+    <a:masterClrMapping/>
+  </p:clrMapOvr>
+  <p:transition>
+    <p:fade/>
+  </p:transition>
+  <p:timing>
+    <p:tnLst>
+      <p:par>
+        <p:cTn id="1" dur="indefinite" restart="never" nodeType="tmRoot"/>
+      </p:par>
+    </p:tnLst>
+  </p:timing>
 </p:sld>
 </file>
 

</xml_diff>